<commit_message>
Update to powerpoint for week 5 demo
</commit_message>
<xml_diff>
--- a/Documentation/Demo 2.pptx
+++ b/Documentation/Demo 2.pptx
@@ -8,8 +8,12 @@
     <p:sldId id="256" r:id="rId2"/>
     <p:sldId id="257" r:id="rId3"/>
     <p:sldId id="258" r:id="rId4"/>
-    <p:sldId id="259" r:id="rId5"/>
-    <p:sldId id="260" r:id="rId6"/>
+    <p:sldId id="260" r:id="rId5"/>
+    <p:sldId id="259" r:id="rId6"/>
+    <p:sldId id="261" r:id="rId7"/>
+    <p:sldId id="263" r:id="rId8"/>
+    <p:sldId id="264" r:id="rId9"/>
+    <p:sldId id="262" r:id="rId10"/>
   </p:sldIdLst>
   <p:sldSz cx="12192000" cy="6858000"/>
   <p:notesSz cx="6858000" cy="9144000"/>
@@ -839,7 +843,7 @@
             <a:fld id="{B61BEF0D-F0BB-DE4B-95CE-6DB70DBA9567}" type="datetimeFigureOut">
               <a:rPr lang="en-US" dirty="0"/>
               <a:pPr/>
-              <a:t>9/16/2014</a:t>
+              <a:t>9/17/2014</a:t>
             </a:fld>
             <a:endParaRPr lang="en-US" dirty="0"/>
           </a:p>
@@ -1087,7 +1091,7 @@
             <a:fld id="{B61BEF0D-F0BB-DE4B-95CE-6DB70DBA9567}" type="datetimeFigureOut">
               <a:rPr lang="en-US" dirty="0"/>
               <a:pPr/>
-              <a:t>9/16/2014</a:t>
+              <a:t>9/17/2014</a:t>
             </a:fld>
             <a:endParaRPr lang="en-US" dirty="0"/>
           </a:p>
@@ -1398,7 +1402,7 @@
             <a:fld id="{B61BEF0D-F0BB-DE4B-95CE-6DB70DBA9567}" type="datetimeFigureOut">
               <a:rPr lang="en-US" dirty="0"/>
               <a:pPr/>
-              <a:t>9/16/2014</a:t>
+              <a:t>9/17/2014</a:t>
             </a:fld>
             <a:endParaRPr lang="en-US" dirty="0"/>
           </a:p>
@@ -1736,7 +1740,7 @@
             <a:fld id="{B61BEF0D-F0BB-DE4B-95CE-6DB70DBA9567}" type="datetimeFigureOut">
               <a:rPr lang="en-US" dirty="0"/>
               <a:pPr/>
-              <a:t>9/16/2014</a:t>
+              <a:t>9/17/2014</a:t>
             </a:fld>
             <a:endParaRPr lang="en-US" dirty="0"/>
           </a:p>
@@ -2047,7 +2051,7 @@
             <a:fld id="{B61BEF0D-F0BB-DE4B-95CE-6DB70DBA9567}" type="datetimeFigureOut">
               <a:rPr lang="en-US" dirty="0"/>
               <a:pPr/>
-              <a:t>9/16/2014</a:t>
+              <a:t>9/17/2014</a:t>
             </a:fld>
             <a:endParaRPr lang="en-US" dirty="0"/>
           </a:p>
@@ -2437,7 +2441,7 @@
             <a:fld id="{B61BEF0D-F0BB-DE4B-95CE-6DB70DBA9567}" type="datetimeFigureOut">
               <a:rPr lang="en-US" dirty="0"/>
               <a:pPr/>
-              <a:t>9/16/2014</a:t>
+              <a:t>9/17/2014</a:t>
             </a:fld>
             <a:endParaRPr lang="en-US" dirty="0"/>
           </a:p>
@@ -2603,7 +2607,7 @@
           <a:p>
             <a:fld id="{55C6B4A9-1611-4792-9094-5F34BCA07E0B}" type="datetimeFigureOut">
               <a:rPr lang="en-US" dirty="0"/>
-              <a:t>9/16/2014</a:t>
+              <a:t>9/17/2014</a:t>
             </a:fld>
             <a:endParaRPr lang="en-US" dirty="0"/>
           </a:p>
@@ -2779,7 +2783,7 @@
             <a:fld id="{B61BEF0D-F0BB-DE4B-95CE-6DB70DBA9567}" type="datetimeFigureOut">
               <a:rPr lang="en-US" dirty="0"/>
               <a:pPr/>
-              <a:t>9/16/2014</a:t>
+              <a:t>9/17/2014</a:t>
             </a:fld>
             <a:endParaRPr lang="en-US" dirty="0"/>
           </a:p>
@@ -2952,7 +2956,7 @@
             <a:fld id="{B61BEF0D-F0BB-DE4B-95CE-6DB70DBA9567}" type="datetimeFigureOut">
               <a:rPr lang="en-US" dirty="0"/>
               <a:pPr/>
-              <a:t>9/16/2014</a:t>
+              <a:t>9/17/2014</a:t>
             </a:fld>
             <a:endParaRPr lang="en-US" dirty="0"/>
           </a:p>
@@ -3196,7 +3200,7 @@
             <a:fld id="{B61BEF0D-F0BB-DE4B-95CE-6DB70DBA9567}" type="datetimeFigureOut">
               <a:rPr lang="en-US" dirty="0"/>
               <a:pPr/>
-              <a:t>9/16/2014</a:t>
+              <a:t>9/17/2014</a:t>
             </a:fld>
             <a:endParaRPr lang="en-US" dirty="0"/>
           </a:p>
@@ -3424,7 +3428,7 @@
           <a:p>
             <a:fld id="{EB712588-04B1-427B-82EE-E8DB90309F08}" type="datetimeFigureOut">
               <a:rPr lang="en-US" dirty="0"/>
-              <a:t>9/16/2014</a:t>
+              <a:t>9/17/2014</a:t>
             </a:fld>
             <a:endParaRPr lang="en-US" dirty="0"/>
           </a:p>
@@ -3794,7 +3798,7 @@
             <a:fld id="{B61BEF0D-F0BB-DE4B-95CE-6DB70DBA9567}" type="datetimeFigureOut">
               <a:rPr lang="en-US" dirty="0"/>
               <a:pPr/>
-              <a:t>9/16/2014</a:t>
+              <a:t>9/17/2014</a:t>
             </a:fld>
             <a:endParaRPr lang="en-US" dirty="0"/>
           </a:p>
@@ -3914,7 +3918,7 @@
             <a:fld id="{B61BEF0D-F0BB-DE4B-95CE-6DB70DBA9567}" type="datetimeFigureOut">
               <a:rPr lang="en-US" dirty="0"/>
               <a:pPr/>
-              <a:t>9/16/2014</a:t>
+              <a:t>9/17/2014</a:t>
             </a:fld>
             <a:endParaRPr lang="en-US" dirty="0"/>
           </a:p>
@@ -4006,7 +4010,7 @@
             <a:fld id="{B61BEF0D-F0BB-DE4B-95CE-6DB70DBA9567}" type="datetimeFigureOut">
               <a:rPr lang="en-US" dirty="0"/>
               <a:pPr/>
-              <a:t>9/16/2014</a:t>
+              <a:t>9/17/2014</a:t>
             </a:fld>
             <a:endParaRPr lang="en-US" dirty="0"/>
           </a:p>
@@ -4257,7 +4261,7 @@
           <a:p>
             <a:fld id="{42A54C80-263E-416B-A8E0-580EDEADCBDC}" type="datetimeFigureOut">
               <a:rPr lang="en-US" dirty="0"/>
-              <a:t>9/16/2014</a:t>
+              <a:t>9/17/2014</a:t>
             </a:fld>
             <a:endParaRPr lang="en-US" dirty="0"/>
           </a:p>
@@ -4516,7 +4520,7 @@
             <a:fld id="{B61BEF0D-F0BB-DE4B-95CE-6DB70DBA9567}" type="datetimeFigureOut">
               <a:rPr lang="en-US" dirty="0"/>
               <a:pPr/>
-              <a:t>9/16/2014</a:t>
+              <a:t>9/17/2014</a:t>
             </a:fld>
             <a:endParaRPr lang="en-US" dirty="0"/>
           </a:p>
@@ -5256,7 +5260,7 @@
             <a:fld id="{B61BEF0D-F0BB-DE4B-95CE-6DB70DBA9567}" type="datetimeFigureOut">
               <a:rPr lang="en-US" dirty="0"/>
               <a:pPr/>
-              <a:t>9/16/2014</a:t>
+              <a:t>9/17/2014</a:t>
             </a:fld>
             <a:endParaRPr lang="en-US" dirty="0"/>
           </a:p>
@@ -5851,6 +5855,75 @@
           </a:p>
         </p:txBody>
       </p:sp>
+      <p:sp>
+        <p:nvSpPr>
+          <p:cNvPr id="4" name="TextBox 3"/>
+          <p:cNvSpPr txBox="1"/>
+          <p:nvPr/>
+        </p:nvSpPr>
+        <p:spPr>
+          <a:xfrm>
+            <a:off x="9341224" y="5934670"/>
+            <a:ext cx="2850776" cy="923330"/>
+          </a:xfrm>
+          <a:prstGeom prst="rect">
+            <a:avLst/>
+          </a:prstGeom>
+          <a:noFill/>
+        </p:spPr>
+        <p:txBody>
+          <a:bodyPr wrap="square" rtlCol="0">
+            <a:spAutoFit/>
+          </a:bodyPr>
+          <a:lstStyle/>
+          <a:p>
+            <a:pPr algn="ctr"/>
+            <a:r>
+              <a:rPr lang="en-US" dirty="0" smtClean="0">
+                <a:solidFill>
+                  <a:schemeClr val="tx1">
+                    <a:alpha val="54000"/>
+                  </a:schemeClr>
+                </a:solidFill>
+              </a:rPr>
+              <a:t>David Cindric</a:t>
+            </a:r>
+          </a:p>
+          <a:p>
+            <a:pPr algn="ctr"/>
+            <a:r>
+              <a:rPr lang="en-US" dirty="0" smtClean="0">
+                <a:solidFill>
+                  <a:schemeClr val="tx1">
+                    <a:alpha val="54000"/>
+                  </a:schemeClr>
+                </a:solidFill>
+              </a:rPr>
+              <a:t>Matthew Johnson</a:t>
+            </a:r>
+          </a:p>
+          <a:p>
+            <a:pPr algn="ctr"/>
+            <a:r>
+              <a:rPr lang="en-US" dirty="0" smtClean="0">
+                <a:solidFill>
+                  <a:schemeClr val="tx1">
+                    <a:alpha val="54000"/>
+                  </a:schemeClr>
+                </a:solidFill>
+              </a:rPr>
+              <a:t>18, September 2014</a:t>
+            </a:r>
+            <a:endParaRPr lang="en-US" dirty="0">
+              <a:solidFill>
+                <a:schemeClr val="tx1">
+                  <a:alpha val="54000"/>
+                </a:schemeClr>
+              </a:solidFill>
+            </a:endParaRPr>
+          </a:p>
+        </p:txBody>
+      </p:sp>
     </p:spTree>
     <p:extLst>
       <p:ext uri="{BB962C8B-B14F-4D97-AF65-F5344CB8AC3E}">
@@ -5898,6 +5971,13 @@
           <a:p>
             <a:r>
               <a:rPr lang="en-US" dirty="0" smtClean="0"/>
+              <a:t>Process </a:t>
+            </a:r>
+            <a:br>
+              <a:rPr lang="en-US" dirty="0" smtClean="0"/>
+            </a:br>
+            <a:r>
+              <a:rPr lang="en-US" dirty="0" smtClean="0"/>
               <a:t>Model</a:t>
             </a:r>
             <a:endParaRPr lang="en-US" dirty="0"/>
@@ -5964,6 +6044,36 @@
           </a:p>
         </p:txBody>
       </p:sp>
+      <p:sp>
+        <p:nvSpPr>
+          <p:cNvPr id="3" name="TextBox 2"/>
+          <p:cNvSpPr txBox="1"/>
+          <p:nvPr/>
+        </p:nvSpPr>
+        <p:spPr>
+          <a:xfrm>
+            <a:off x="4016187" y="2348753"/>
+            <a:ext cx="735106" cy="307777"/>
+          </a:xfrm>
+          <a:prstGeom prst="rect">
+            <a:avLst/>
+          </a:prstGeom>
+          <a:noFill/>
+        </p:spPr>
+        <p:txBody>
+          <a:bodyPr wrap="square" rtlCol="0">
+            <a:spAutoFit/>
+          </a:bodyPr>
+          <a:lstStyle/>
+          <a:p>
+            <a:r>
+              <a:rPr lang="en-US" sz="1400" dirty="0" smtClean="0"/>
+              <a:t>Start</a:t>
+            </a:r>
+            <a:endParaRPr lang="en-US" dirty="0"/>
+          </a:p>
+        </p:txBody>
+      </p:sp>
     </p:spTree>
     <p:extLst>
       <p:ext uri="{BB962C8B-B14F-4D97-AF65-F5344CB8AC3E}">
@@ -6011,7 +6121,7 @@
           <a:p>
             <a:r>
               <a:rPr lang="en-US" dirty="0" smtClean="0"/>
-              <a:t>Data Dictionary</a:t>
+              <a:t>Data Definitions</a:t>
             </a:r>
             <a:endParaRPr lang="en-US" dirty="0"/>
           </a:p>
@@ -6030,13 +6140,13 @@
         <p:spPr/>
         <p:txBody>
           <a:bodyPr>
-            <a:normAutofit fontScale="92500" lnSpcReduction="20000"/>
+            <a:normAutofit fontScale="62500" lnSpcReduction="20000"/>
           </a:bodyPr>
           <a:lstStyle/>
           <a:p>
             <a:r>
               <a:rPr lang="en-US" dirty="0" smtClean="0"/>
-              <a:t>Character: Encapsulates all information about the character. Contains name, race, description, and other details.</a:t>
+              <a:t>Character: Encapsulates all information about the character. Contains name, race, description, and other relevant details.</a:t>
             </a:r>
           </a:p>
           <a:p>
@@ -6054,13 +6164,10 @@
           <a:p>
             <a:r>
               <a:rPr lang="en-US" dirty="0" smtClean="0"/>
-              <a:t>Feat: Contains the description of the feat and the requirements to acquire.</a:t>
-            </a:r>
-          </a:p>
-          <a:p>
-            <a:pPr marL="0" indent="0">
-              <a:buNone/>
-            </a:pPr>
+              <a:t>Feat: Contains the description of the feat and the requirements to acquire</a:t>
+            </a:r>
+          </a:p>
+          <a:p>
             <a:endParaRPr lang="en-US" dirty="0" smtClean="0"/>
           </a:p>
           <a:p>
@@ -6075,7 +6182,25 @@
           <a:p>
             <a:r>
               <a:rPr lang="en-US" dirty="0" smtClean="0"/>
-              <a:t>Etc…</a:t>
+              <a:t>Abilities: Contains the characters attributes. Strength, Intelligence, etc…</a:t>
+            </a:r>
+          </a:p>
+          <a:p>
+            <a:endParaRPr lang="en-US" dirty="0" smtClean="0"/>
+          </a:p>
+          <a:p>
+            <a:r>
+              <a:rPr lang="en-US" dirty="0" smtClean="0"/>
+              <a:t>Special Ability: Contains description of a special ability certain characters may have</a:t>
+            </a:r>
+          </a:p>
+          <a:p>
+            <a:endParaRPr lang="en-US" dirty="0" smtClean="0"/>
+          </a:p>
+          <a:p>
+            <a:r>
+              <a:rPr lang="en-US" dirty="0" smtClean="0"/>
+              <a:t>Skills: Contains names and descriptions of skills a character possesses. Ex: Acrobatics, Diplomacy, etc…</a:t>
             </a:r>
           </a:p>
           <a:p>
@@ -6163,65 +6288,7 @@
           <a:p>
             <a:r>
               <a:rPr lang="en-US" dirty="0" smtClean="0"/>
-              <a:t>File </a:t>
-            </a:r>
-            <a:r>
-              <a:rPr lang="en-US" dirty="0" err="1" smtClean="0"/>
-              <a:t>vs</a:t>
-            </a:r>
-            <a:r>
-              <a:rPr lang="en-US" dirty="0" smtClean="0"/>
-              <a:t> Database</a:t>
-            </a:r>
-            <a:endParaRPr lang="en-US" dirty="0"/>
-          </a:p>
-        </p:txBody>
-      </p:sp>
-      <p:sp>
-        <p:nvSpPr>
-          <p:cNvPr id="3" name="Content Placeholder 2"/>
-          <p:cNvSpPr>
-            <a:spLocks noGrp="1"/>
-          </p:cNvSpPr>
-          <p:nvPr>
-            <p:ph idx="1"/>
-          </p:nvPr>
-        </p:nvSpPr>
-        <p:spPr/>
-        <p:txBody>
-          <a:bodyPr/>
-          <a:lstStyle/>
-          <a:p>
-            <a:r>
-              <a:rPr lang="en-US" dirty="0" smtClean="0"/>
-              <a:t>File provides easy access</a:t>
-            </a:r>
-          </a:p>
-          <a:p>
-            <a:endParaRPr lang="en-US" dirty="0"/>
-          </a:p>
-          <a:p>
-            <a:r>
-              <a:rPr lang="en-US" dirty="0" smtClean="0"/>
-              <a:t>Object can be serialized</a:t>
-            </a:r>
-          </a:p>
-          <a:p>
-            <a:endParaRPr lang="en-US" dirty="0"/>
-          </a:p>
-          <a:p>
-            <a:r>
-              <a:rPr lang="en-US" dirty="0" smtClean="0"/>
-              <a:t>Database provides more structure</a:t>
-            </a:r>
-          </a:p>
-          <a:p>
-            <a:endParaRPr lang="en-US" dirty="0"/>
-          </a:p>
-          <a:p>
-            <a:r>
-              <a:rPr lang="en-US" dirty="0" smtClean="0"/>
-              <a:t>Database provides indexing</a:t>
+              <a:t>Data Model</a:t>
             </a:r>
             <a:endParaRPr lang="en-US" dirty="0"/>
           </a:p>
@@ -6257,10 +6324,76 @@
           </a:p>
         </p:txBody>
       </p:sp>
+      <p:pic>
+        <p:nvPicPr>
+          <p:cNvPr id="1026" name="Picture 2"/>
+          <p:cNvPicPr>
+            <a:picLocks noGrp="1" noChangeAspect="1" noChangeArrowheads="1"/>
+          </p:cNvPicPr>
+          <p:nvPr>
+            <p:ph idx="1"/>
+          </p:nvPr>
+        </p:nvPicPr>
+        <p:blipFill>
+          <a:blip r:embed="rId2">
+            <a:extLst>
+              <a:ext uri="{28A0092B-C50C-407E-A947-70E740481C1C}">
+                <a14:useLocalDpi xmlns:a14="http://schemas.microsoft.com/office/drawing/2010/main" val="0"/>
+              </a:ext>
+            </a:extLst>
+          </a:blip>
+          <a:srcRect/>
+          <a:stretch>
+            <a:fillRect/>
+          </a:stretch>
+        </p:blipFill>
+        <p:spPr bwMode="auto">
+          <a:xfrm>
+            <a:off x="1576858" y="2280906"/>
+            <a:ext cx="6798322" cy="3640801"/>
+          </a:xfrm>
+          <a:prstGeom prst="rect">
+            <a:avLst/>
+          </a:prstGeom>
+          <a:noFill/>
+          <a:ln>
+            <a:noFill/>
+          </a:ln>
+          <a:effectLst/>
+          <a:extLst>
+            <a:ext uri="{909E8E84-426E-40DD-AFC4-6F175D3DCCD1}">
+              <a14:hiddenFill xmlns:a14="http://schemas.microsoft.com/office/drawing/2010/main">
+                <a:solidFill>
+                  <a:schemeClr val="accent1"/>
+                </a:solidFill>
+              </a14:hiddenFill>
+            </a:ext>
+            <a:ext uri="{91240B29-F687-4F45-9708-019B960494DF}">
+              <a14:hiddenLine xmlns:a14="http://schemas.microsoft.com/office/drawing/2010/main" w="9525">
+                <a:solidFill>
+                  <a:schemeClr val="tx1"/>
+                </a:solidFill>
+                <a:miter lim="800000"/>
+                <a:headEnd/>
+                <a:tailEnd/>
+              </a14:hiddenLine>
+            </a:ext>
+            <a:ext uri="{AF507438-7753-43E0-B8FC-AC1667EBCBE1}">
+              <a14:hiddenEffects xmlns:a14="http://schemas.microsoft.com/office/drawing/2010/main">
+                <a:effectLst>
+                  <a:outerShdw dist="35921" dir="2700000" algn="ctr" rotWithShape="0">
+                    <a:schemeClr val="bg2"/>
+                  </a:outerShdw>
+                </a:effectLst>
+              </a14:hiddenEffects>
+            </a:ext>
+          </a:extLst>
+        </p:spPr>
+      </p:pic>
     </p:spTree>
     <p:extLst>
       <p:ext uri="{BB962C8B-B14F-4D97-AF65-F5344CB8AC3E}">
-        <p14:creationId xmlns:p14="http://schemas.microsoft.com/office/powerpoint/2010/main" val="3416145561"/>
+        <p14:creationId xmlns:p14="http://schemas.microsoft.com/office/powerpoint/2010/main" val="1638491215"/>
       </p:ext>
     </p:extLst>
   </p:cSld>
@@ -6302,6 +6435,33 @@
           <a:bodyPr/>
           <a:lstStyle/>
           <a:p>
+            <a:r>
+              <a:rPr lang="en-US" dirty="0" smtClean="0"/>
+              <a:t>Design </a:t>
+            </a:r>
+            <a:r>
+              <a:rPr lang="en-US" dirty="0" smtClean="0"/>
+              <a:t>Choices</a:t>
+            </a:r>
+            <a:r>
+              <a:rPr lang="en-US" dirty="0" smtClean="0"/>
+              <a:t/>
+            </a:r>
+            <a:br>
+              <a:rPr lang="en-US" dirty="0" smtClean="0"/>
+            </a:br>
+            <a:r>
+              <a:rPr lang="en-US" sz="2800" dirty="0"/>
+              <a:t>	</a:t>
+            </a:r>
+            <a:r>
+              <a:rPr lang="en-US" sz="2800" dirty="0" smtClean="0"/>
+              <a:t>	</a:t>
+            </a:r>
+            <a:r>
+              <a:rPr lang="en-US" sz="2000" dirty="0" smtClean="0"/>
+              <a:t>-Character Storage</a:t>
+            </a:r>
             <a:endParaRPr lang="en-US" dirty="0"/>
           </a:p>
         </p:txBody>
@@ -6321,7 +6481,106 @@
           <a:bodyPr/>
           <a:lstStyle/>
           <a:p>
-            <a:endParaRPr lang="en-US" dirty="0"/>
+            <a:r>
+              <a:rPr lang="en-US" dirty="0"/>
+              <a:t>Serialized Object IO</a:t>
+            </a:r>
+          </a:p>
+          <a:p>
+            <a:pPr lvl="1"/>
+            <a:r>
+              <a:rPr lang="en-US" dirty="0" smtClean="0"/>
+              <a:t>Provides </a:t>
+            </a:r>
+            <a:r>
+              <a:rPr lang="en-US" dirty="0" smtClean="0"/>
+              <a:t>easy access to all information</a:t>
+            </a:r>
+            <a:endParaRPr lang="en-US" dirty="0"/>
+          </a:p>
+          <a:p>
+            <a:pPr lvl="1"/>
+            <a:r>
+              <a:rPr lang="en-US" dirty="0" smtClean="0"/>
+              <a:t>Supplies all </a:t>
+            </a:r>
+            <a:r>
+              <a:rPr lang="en-US" dirty="0" smtClean="0"/>
+              <a:t>information in a single object</a:t>
+            </a:r>
+          </a:p>
+          <a:p>
+            <a:pPr lvl="1"/>
+            <a:r>
+              <a:rPr lang="en-US" dirty="0" smtClean="0"/>
+              <a:t>Easier </a:t>
+            </a:r>
+            <a:r>
+              <a:rPr lang="en-US" dirty="0" smtClean="0"/>
+              <a:t>to work with </a:t>
+            </a:r>
+            <a:r>
+              <a:rPr lang="en-US" dirty="0" smtClean="0"/>
+              <a:t>programmatically</a:t>
+            </a:r>
+          </a:p>
+          <a:p>
+            <a:r>
+              <a:rPr lang="en-US" dirty="0" smtClean="0"/>
+              <a:t>Databases</a:t>
+            </a:r>
+            <a:endParaRPr lang="en-US" dirty="0" smtClean="0"/>
+          </a:p>
+          <a:p>
+            <a:pPr lvl="1"/>
+            <a:r>
+              <a:rPr lang="en-US" dirty="0" smtClean="0"/>
+              <a:t>Provides more </a:t>
+            </a:r>
+            <a:r>
+              <a:rPr lang="en-US" dirty="0" smtClean="0"/>
+              <a:t>structure</a:t>
+            </a:r>
+            <a:endParaRPr lang="en-US" dirty="0"/>
+          </a:p>
+          <a:p>
+            <a:pPr lvl="1"/>
+            <a:r>
+              <a:rPr lang="en-US" dirty="0" smtClean="0"/>
+              <a:t>Support for indexing, resulting in faster load times for subsets of the data</a:t>
+            </a:r>
+            <a:endParaRPr lang="en-US" dirty="0" smtClean="0"/>
+          </a:p>
+          <a:p>
+            <a:pPr lvl="1"/>
+            <a:r>
+              <a:rPr lang="en-US" dirty="0" smtClean="0"/>
+              <a:t>Can supply </a:t>
+            </a:r>
+            <a:r>
+              <a:rPr lang="en-US" dirty="0"/>
+              <a:t>partial </a:t>
+            </a:r>
+            <a:r>
+              <a:rPr lang="en-US" dirty="0" smtClean="0"/>
+              <a:t>information</a:t>
+            </a:r>
+          </a:p>
+          <a:p>
+            <a:pPr lvl="1"/>
+            <a:r>
+              <a:rPr lang="en-US" dirty="0" smtClean="0"/>
+              <a:t>Allows </a:t>
+            </a:r>
+            <a:r>
+              <a:rPr lang="en-US" dirty="0" smtClean="0"/>
+              <a:t>for better memory management through partial </a:t>
+            </a:r>
+            <a:r>
+              <a:rPr lang="en-US" dirty="0" smtClean="0"/>
+              <a:t>loading of data</a:t>
+            </a:r>
+            <a:endParaRPr lang="en-US" dirty="0" smtClean="0"/>
           </a:p>
         </p:txBody>
       </p:sp>
@@ -6349,7 +6608,7 @@
           <a:p>
             <a:r>
               <a:rPr lang="en-US" dirty="0" smtClean="0"/>
-              <a:t>Slide 1</a:t>
+              <a:t>Slide 5</a:t>
             </a:r>
             <a:endParaRPr lang="en-US" dirty="0"/>
           </a:p>
@@ -6358,7 +6617,751 @@
     </p:spTree>
     <p:extLst>
       <p:ext uri="{BB962C8B-B14F-4D97-AF65-F5344CB8AC3E}">
-        <p14:creationId xmlns:p14="http://schemas.microsoft.com/office/powerpoint/2010/main" val="1638491215"/>
+        <p14:creationId xmlns:p14="http://schemas.microsoft.com/office/powerpoint/2010/main" val="3416145561"/>
+      </p:ext>
+    </p:extLst>
+  </p:cSld>
+  <p:clrMapOvr>
+    <a:masterClrMapping/>
+  </p:clrMapOvr>
+</p:sld>
+</file>
+
+<file path=ppt/slides/slide6.xml><?xml version="1.0" encoding="utf-8"?>
+<p:sld xmlns:a="http://schemas.openxmlformats.org/drawingml/2006/main" xmlns:r="http://schemas.openxmlformats.org/officeDocument/2006/relationships" xmlns:p="http://schemas.openxmlformats.org/presentationml/2006/main">
+  <p:cSld>
+    <p:spTree>
+      <p:nvGrpSpPr>
+        <p:cNvPr id="1" name=""/>
+        <p:cNvGrpSpPr/>
+        <p:nvPr/>
+      </p:nvGrpSpPr>
+      <p:grpSpPr>
+        <a:xfrm>
+          <a:off x="0" y="0"/>
+          <a:ext cx="0" cy="0"/>
+          <a:chOff x="0" y="0"/>
+          <a:chExt cx="0" cy="0"/>
+        </a:xfrm>
+      </p:grpSpPr>
+      <p:sp>
+        <p:nvSpPr>
+          <p:cNvPr id="2" name="Title 1"/>
+          <p:cNvSpPr>
+            <a:spLocks noGrp="1"/>
+          </p:cNvSpPr>
+          <p:nvPr>
+            <p:ph type="title"/>
+          </p:nvPr>
+        </p:nvSpPr>
+        <p:spPr/>
+        <p:txBody>
+          <a:bodyPr/>
+          <a:lstStyle/>
+          <a:p>
+            <a:r>
+              <a:rPr lang="en-US" dirty="0" smtClean="0"/>
+              <a:t>Design </a:t>
+            </a:r>
+            <a:r>
+              <a:rPr lang="en-US" dirty="0" smtClean="0"/>
+              <a:t>Choices</a:t>
+            </a:r>
+            <a:r>
+              <a:rPr lang="en-US" dirty="0"/>
+              <a:t/>
+            </a:r>
+            <a:br>
+              <a:rPr lang="en-US" dirty="0"/>
+            </a:br>
+            <a:r>
+              <a:rPr lang="en-US" dirty="0" smtClean="0"/>
+              <a:t>		</a:t>
+            </a:r>
+            <a:r>
+              <a:rPr lang="en-US" sz="2000" dirty="0" smtClean="0"/>
+              <a:t>-Social Features</a:t>
+            </a:r>
+            <a:endParaRPr lang="en-US" dirty="0" smtClean="0"/>
+          </a:p>
+        </p:txBody>
+      </p:sp>
+      <p:sp>
+        <p:nvSpPr>
+          <p:cNvPr id="3" name="Content Placeholder 2"/>
+          <p:cNvSpPr>
+            <a:spLocks noGrp="1"/>
+          </p:cNvSpPr>
+          <p:nvPr>
+            <p:ph idx="1"/>
+          </p:nvPr>
+        </p:nvSpPr>
+        <p:spPr/>
+        <p:txBody>
+          <a:bodyPr>
+            <a:normAutofit fontScale="92500" lnSpcReduction="20000"/>
+          </a:bodyPr>
+          <a:lstStyle/>
+          <a:p>
+            <a:r>
+              <a:rPr lang="en-US" dirty="0" smtClean="0"/>
+              <a:t>Bluetooth</a:t>
+            </a:r>
+          </a:p>
+          <a:p>
+            <a:pPr lvl="1"/>
+            <a:r>
+              <a:rPr lang="en-US" dirty="0" smtClean="0"/>
+              <a:t>Available on practically all Android devices</a:t>
+            </a:r>
+          </a:p>
+          <a:p>
+            <a:pPr lvl="1"/>
+            <a:r>
+              <a:rPr lang="en-US" dirty="0" smtClean="0"/>
+              <a:t>Low range</a:t>
+            </a:r>
+            <a:endParaRPr lang="en-US" dirty="0" smtClean="0"/>
+          </a:p>
+          <a:p>
+            <a:r>
+              <a:rPr lang="en-US" dirty="0" smtClean="0"/>
+              <a:t>Wi-Fi Direct</a:t>
+            </a:r>
+          </a:p>
+          <a:p>
+            <a:pPr lvl="1"/>
+            <a:r>
+              <a:rPr lang="en-US" dirty="0" smtClean="0"/>
+              <a:t>Only available on devices that have been released very recently</a:t>
+            </a:r>
+          </a:p>
+          <a:p>
+            <a:pPr lvl="1"/>
+            <a:r>
+              <a:rPr lang="en-US" dirty="0" smtClean="0"/>
+              <a:t>Fast transfer speeds and longer range than Bluetooth</a:t>
+            </a:r>
+          </a:p>
+          <a:p>
+            <a:r>
+              <a:rPr lang="en-US" dirty="0" smtClean="0"/>
+              <a:t>GPS</a:t>
+            </a:r>
+          </a:p>
+          <a:p>
+            <a:pPr lvl="1"/>
+            <a:r>
+              <a:rPr lang="en-US" dirty="0" smtClean="0"/>
+              <a:t>Allows players to find nearby users of the application</a:t>
+            </a:r>
+            <a:endParaRPr lang="en-US" dirty="0" smtClean="0"/>
+          </a:p>
+          <a:p>
+            <a:pPr lvl="1"/>
+            <a:r>
+              <a:rPr lang="en-US" dirty="0" smtClean="0"/>
+              <a:t>Requires the use of a dedicated server to handle requests</a:t>
+            </a:r>
+            <a:endParaRPr lang="en-US" dirty="0" smtClean="0"/>
+          </a:p>
+          <a:p>
+            <a:r>
+              <a:rPr lang="en-US" dirty="0" smtClean="0"/>
+              <a:t>Cloud Sync</a:t>
+            </a:r>
+          </a:p>
+          <a:p>
+            <a:pPr lvl="1"/>
+            <a:r>
+              <a:rPr lang="en-US" dirty="0" smtClean="0"/>
+              <a:t>Characters can be shared between two users anywhere in the world</a:t>
+            </a:r>
+          </a:p>
+          <a:p>
+            <a:pPr lvl="1"/>
+            <a:r>
+              <a:rPr lang="en-US" dirty="0" smtClean="0"/>
+              <a:t>Requires the use of a dedicated server, as well as storage for character uploads</a:t>
+            </a:r>
+            <a:endParaRPr lang="en-US" dirty="0"/>
+          </a:p>
+        </p:txBody>
+      </p:sp>
+      <p:sp>
+        <p:nvSpPr>
+          <p:cNvPr id="4" name="TextBox 3"/>
+          <p:cNvSpPr txBox="1"/>
+          <p:nvPr/>
+        </p:nvSpPr>
+        <p:spPr>
+          <a:xfrm>
+            <a:off x="471286" y="6488668"/>
+            <a:ext cx="1163305" cy="369332"/>
+          </a:xfrm>
+          <a:prstGeom prst="rect">
+            <a:avLst/>
+          </a:prstGeom>
+          <a:noFill/>
+        </p:spPr>
+        <p:txBody>
+          <a:bodyPr wrap="square" rtlCol="0">
+            <a:spAutoFit/>
+          </a:bodyPr>
+          <a:lstStyle/>
+          <a:p>
+            <a:r>
+              <a:rPr lang="en-US" dirty="0" smtClean="0"/>
+              <a:t>Slide 6</a:t>
+            </a:r>
+            <a:endParaRPr lang="en-US" dirty="0"/>
+          </a:p>
+        </p:txBody>
+      </p:sp>
+    </p:spTree>
+    <p:extLst>
+      <p:ext uri="{BB962C8B-B14F-4D97-AF65-F5344CB8AC3E}">
+        <p14:creationId xmlns:p14="http://schemas.microsoft.com/office/powerpoint/2010/main" val="199569734"/>
+      </p:ext>
+    </p:extLst>
+  </p:cSld>
+  <p:clrMapOvr>
+    <a:masterClrMapping/>
+  </p:clrMapOvr>
+</p:sld>
+</file>
+
+<file path=ppt/slides/slide7.xml><?xml version="1.0" encoding="utf-8"?>
+<p:sld xmlns:a="http://schemas.openxmlformats.org/drawingml/2006/main" xmlns:r="http://schemas.openxmlformats.org/officeDocument/2006/relationships" xmlns:p="http://schemas.openxmlformats.org/presentationml/2006/main">
+  <p:cSld>
+    <p:spTree>
+      <p:nvGrpSpPr>
+        <p:cNvPr id="1" name=""/>
+        <p:cNvGrpSpPr/>
+        <p:nvPr/>
+      </p:nvGrpSpPr>
+      <p:grpSpPr>
+        <a:xfrm>
+          <a:off x="0" y="0"/>
+          <a:ext cx="0" cy="0"/>
+          <a:chOff x="0" y="0"/>
+          <a:chExt cx="0" cy="0"/>
+        </a:xfrm>
+      </p:grpSpPr>
+      <p:sp>
+        <p:nvSpPr>
+          <p:cNvPr id="2" name="Title 1"/>
+          <p:cNvSpPr>
+            <a:spLocks noGrp="1"/>
+          </p:cNvSpPr>
+          <p:nvPr>
+            <p:ph type="title"/>
+          </p:nvPr>
+        </p:nvSpPr>
+        <p:spPr/>
+        <p:txBody>
+          <a:bodyPr/>
+          <a:lstStyle/>
+          <a:p>
+            <a:r>
+              <a:rPr lang="en-US" dirty="0" smtClean="0"/>
+              <a:t>System </a:t>
+            </a:r>
+            <a:r>
+              <a:rPr lang="en-US" dirty="0" smtClean="0"/>
+              <a:t>Analysis and Design Constraints</a:t>
+            </a:r>
+            <a:endParaRPr lang="en-US" dirty="0"/>
+          </a:p>
+        </p:txBody>
+      </p:sp>
+      <p:sp>
+        <p:nvSpPr>
+          <p:cNvPr id="3" name="Content Placeholder 2"/>
+          <p:cNvSpPr>
+            <a:spLocks noGrp="1"/>
+          </p:cNvSpPr>
+          <p:nvPr>
+            <p:ph idx="1"/>
+          </p:nvPr>
+        </p:nvSpPr>
+        <p:spPr/>
+        <p:txBody>
+          <a:bodyPr/>
+          <a:lstStyle/>
+          <a:p>
+            <a:r>
+              <a:rPr lang="en-US" dirty="0" smtClean="0"/>
+              <a:t>Processor Time Management</a:t>
+            </a:r>
+          </a:p>
+          <a:p>
+            <a:pPr lvl="1"/>
+            <a:r>
+              <a:rPr lang="en-US" dirty="0" smtClean="0"/>
+              <a:t>When are calculations performed?</a:t>
+            </a:r>
+          </a:p>
+          <a:p>
+            <a:pPr lvl="2"/>
+            <a:r>
+              <a:rPr lang="en-US" dirty="0" smtClean="0"/>
+              <a:t>Perform calculations ahead of time and store in memory, or repeatedly perform them when the result is required?</a:t>
+            </a:r>
+            <a:endParaRPr lang="en-US" dirty="0" smtClean="0"/>
+          </a:p>
+          <a:p>
+            <a:pPr lvl="1"/>
+            <a:r>
+              <a:rPr lang="en-US" dirty="0" smtClean="0"/>
+              <a:t>How often is the character saved?</a:t>
+            </a:r>
+          </a:p>
+          <a:p>
+            <a:pPr lvl="2"/>
+            <a:r>
+              <a:rPr lang="en-US" dirty="0" smtClean="0"/>
+              <a:t>Saving too often could </a:t>
+            </a:r>
+            <a:r>
+              <a:rPr lang="en-US" dirty="0" smtClean="0"/>
+              <a:t>lower the overall responsiveness of the UI</a:t>
+            </a:r>
+          </a:p>
+          <a:p>
+            <a:pPr lvl="2"/>
+            <a:r>
+              <a:rPr lang="en-US" dirty="0" smtClean="0"/>
+              <a:t>Saving too rarely could cause a potential loss of information</a:t>
+            </a:r>
+            <a:endParaRPr lang="en-US" dirty="0" smtClean="0"/>
+          </a:p>
+          <a:p>
+            <a:pPr lvl="1"/>
+            <a:r>
+              <a:rPr lang="en-US" dirty="0" smtClean="0"/>
+              <a:t>How often are Wi-Fi direct </a:t>
+            </a:r>
+            <a:r>
+              <a:rPr lang="en-US" dirty="0" smtClean="0"/>
+              <a:t>or Bluetooth used</a:t>
+            </a:r>
+            <a:r>
+              <a:rPr lang="en-US" dirty="0" smtClean="0"/>
+              <a:t>?</a:t>
+            </a:r>
+          </a:p>
+          <a:p>
+            <a:pPr lvl="2"/>
+            <a:r>
+              <a:rPr lang="en-US" dirty="0" smtClean="0"/>
+              <a:t>Are other users constantly being searched for?</a:t>
+            </a:r>
+          </a:p>
+          <a:p>
+            <a:pPr lvl="2"/>
+            <a:r>
+              <a:rPr lang="en-US" dirty="0" smtClean="0"/>
+              <a:t>Should the player choose when to look for others to share his character with?</a:t>
+            </a:r>
+          </a:p>
+        </p:txBody>
+      </p:sp>
+      <p:sp>
+        <p:nvSpPr>
+          <p:cNvPr id="5" name="TextBox 4"/>
+          <p:cNvSpPr txBox="1"/>
+          <p:nvPr/>
+        </p:nvSpPr>
+        <p:spPr>
+          <a:xfrm>
+            <a:off x="471286" y="6488668"/>
+            <a:ext cx="1163305" cy="369332"/>
+          </a:xfrm>
+          <a:prstGeom prst="rect">
+            <a:avLst/>
+          </a:prstGeom>
+          <a:noFill/>
+        </p:spPr>
+        <p:txBody>
+          <a:bodyPr wrap="square" rtlCol="0">
+            <a:spAutoFit/>
+          </a:bodyPr>
+          <a:lstStyle/>
+          <a:p>
+            <a:r>
+              <a:rPr lang="en-US" dirty="0" smtClean="0"/>
+              <a:t>Slide 7</a:t>
+            </a:r>
+            <a:endParaRPr lang="en-US" dirty="0"/>
+          </a:p>
+        </p:txBody>
+      </p:sp>
+    </p:spTree>
+    <p:extLst>
+      <p:ext uri="{BB962C8B-B14F-4D97-AF65-F5344CB8AC3E}">
+        <p14:creationId xmlns:p14="http://schemas.microsoft.com/office/powerpoint/2010/main" val="710287258"/>
+      </p:ext>
+    </p:extLst>
+  </p:cSld>
+  <p:clrMapOvr>
+    <a:masterClrMapping/>
+  </p:clrMapOvr>
+</p:sld>
+</file>
+
+<file path=ppt/slides/slide8.xml><?xml version="1.0" encoding="utf-8"?>
+<p:sld xmlns:a="http://schemas.openxmlformats.org/drawingml/2006/main" xmlns:r="http://schemas.openxmlformats.org/officeDocument/2006/relationships" xmlns:p="http://schemas.openxmlformats.org/presentationml/2006/main">
+  <p:cSld>
+    <p:spTree>
+      <p:nvGrpSpPr>
+        <p:cNvPr id="1" name=""/>
+        <p:cNvGrpSpPr/>
+        <p:nvPr/>
+      </p:nvGrpSpPr>
+      <p:grpSpPr>
+        <a:xfrm>
+          <a:off x="0" y="0"/>
+          <a:ext cx="0" cy="0"/>
+          <a:chOff x="0" y="0"/>
+          <a:chExt cx="0" cy="0"/>
+        </a:xfrm>
+      </p:grpSpPr>
+      <p:sp>
+        <p:nvSpPr>
+          <p:cNvPr id="2" name="Title 1"/>
+          <p:cNvSpPr>
+            <a:spLocks noGrp="1"/>
+          </p:cNvSpPr>
+          <p:nvPr>
+            <p:ph type="title"/>
+          </p:nvPr>
+        </p:nvSpPr>
+        <p:spPr/>
+        <p:txBody>
+          <a:bodyPr/>
+          <a:lstStyle/>
+          <a:p>
+            <a:r>
+              <a:rPr lang="en-US" dirty="0" smtClean="0"/>
+              <a:t>System </a:t>
+            </a:r>
+            <a:r>
+              <a:rPr lang="en-US" dirty="0" smtClean="0"/>
+              <a:t>Analysis and Design Constraints</a:t>
+            </a:r>
+            <a:endParaRPr lang="en-US" dirty="0"/>
+          </a:p>
+        </p:txBody>
+      </p:sp>
+      <p:sp>
+        <p:nvSpPr>
+          <p:cNvPr id="3" name="Content Placeholder 2"/>
+          <p:cNvSpPr>
+            <a:spLocks noGrp="1"/>
+          </p:cNvSpPr>
+          <p:nvPr>
+            <p:ph idx="1"/>
+          </p:nvPr>
+        </p:nvSpPr>
+        <p:spPr/>
+        <p:txBody>
+          <a:bodyPr/>
+          <a:lstStyle/>
+          <a:p>
+            <a:r>
+              <a:rPr lang="en-US" dirty="0"/>
+              <a:t>Memory </a:t>
+            </a:r>
+            <a:r>
+              <a:rPr lang="en-US" dirty="0" smtClean="0"/>
+              <a:t>Management</a:t>
+            </a:r>
+            <a:endParaRPr lang="en-US" dirty="0"/>
+          </a:p>
+          <a:p>
+            <a:pPr lvl="1"/>
+            <a:r>
+              <a:rPr lang="en-US" dirty="0"/>
+              <a:t>As a character grows, so does the amount of memory used</a:t>
+            </a:r>
+          </a:p>
+          <a:p>
+            <a:pPr lvl="1"/>
+            <a:r>
+              <a:rPr lang="en-US" dirty="0"/>
+              <a:t>May be implausible to keep even a single character loaded in </a:t>
+            </a:r>
+            <a:r>
+              <a:rPr lang="en-US" dirty="0" smtClean="0"/>
+              <a:t>memory</a:t>
+            </a:r>
+          </a:p>
+          <a:p>
+            <a:pPr lvl="1"/>
+            <a:r>
+              <a:rPr lang="en-US" dirty="0" smtClean="0"/>
+              <a:t>Application must load very quickly</a:t>
+            </a:r>
+            <a:endParaRPr lang="en-US" dirty="0"/>
+          </a:p>
+          <a:p>
+            <a:r>
+              <a:rPr lang="en-US" dirty="0" smtClean="0"/>
+              <a:t>Power Management</a:t>
+            </a:r>
+          </a:p>
+          <a:p>
+            <a:pPr lvl="1"/>
+            <a:r>
+              <a:rPr lang="en-US" dirty="0" smtClean="0"/>
+              <a:t>Application must be able to handle the phon</a:t>
+            </a:r>
+            <a:r>
+              <a:rPr lang="en-US" dirty="0" smtClean="0"/>
+              <a:t>e being put to sleep constantly as players pick it up to add a single data entry before putting it down again</a:t>
+            </a:r>
+          </a:p>
+          <a:p>
+            <a:pPr lvl="1"/>
+            <a:r>
+              <a:rPr lang="en-US" dirty="0" smtClean="0"/>
+              <a:t>Application may be running in the background for a long period of time, so background processing must be kept to a minimu</a:t>
+            </a:r>
+            <a:r>
+              <a:rPr lang="en-US" dirty="0"/>
+              <a:t>m</a:t>
+            </a:r>
+            <a:endParaRPr lang="en-US" dirty="0" smtClean="0"/>
+          </a:p>
+        </p:txBody>
+      </p:sp>
+      <p:sp>
+        <p:nvSpPr>
+          <p:cNvPr id="5" name="TextBox 4"/>
+          <p:cNvSpPr txBox="1"/>
+          <p:nvPr/>
+        </p:nvSpPr>
+        <p:spPr>
+          <a:xfrm>
+            <a:off x="471285" y="6488668"/>
+            <a:ext cx="1163305" cy="369332"/>
+          </a:xfrm>
+          <a:prstGeom prst="rect">
+            <a:avLst/>
+          </a:prstGeom>
+          <a:noFill/>
+        </p:spPr>
+        <p:txBody>
+          <a:bodyPr wrap="square" rtlCol="0">
+            <a:spAutoFit/>
+          </a:bodyPr>
+          <a:lstStyle/>
+          <a:p>
+            <a:r>
+              <a:rPr lang="en-US" dirty="0" smtClean="0"/>
+              <a:t>Slide </a:t>
+            </a:r>
+            <a:r>
+              <a:rPr lang="en-US" dirty="0"/>
+              <a:t>8</a:t>
+            </a:r>
+          </a:p>
+        </p:txBody>
+      </p:sp>
+    </p:spTree>
+    <p:extLst>
+      <p:ext uri="{BB962C8B-B14F-4D97-AF65-F5344CB8AC3E}">
+        <p14:creationId xmlns:p14="http://schemas.microsoft.com/office/powerpoint/2010/main" val="2865462493"/>
+      </p:ext>
+    </p:extLst>
+  </p:cSld>
+  <p:clrMapOvr>
+    <a:masterClrMapping/>
+  </p:clrMapOvr>
+</p:sld>
+</file>
+
+<file path=ppt/slides/slide9.xml><?xml version="1.0" encoding="utf-8"?>
+<p:sld xmlns:a="http://schemas.openxmlformats.org/drawingml/2006/main" xmlns:r="http://schemas.openxmlformats.org/officeDocument/2006/relationships" xmlns:p="http://schemas.openxmlformats.org/presentationml/2006/main">
+  <p:cSld>
+    <p:spTree>
+      <p:nvGrpSpPr>
+        <p:cNvPr id="1" name=""/>
+        <p:cNvGrpSpPr/>
+        <p:nvPr/>
+      </p:nvGrpSpPr>
+      <p:grpSpPr>
+        <a:xfrm>
+          <a:off x="0" y="0"/>
+          <a:ext cx="0" cy="0"/>
+          <a:chOff x="0" y="0"/>
+          <a:chExt cx="0" cy="0"/>
+        </a:xfrm>
+      </p:grpSpPr>
+      <p:sp>
+        <p:nvSpPr>
+          <p:cNvPr id="2" name="Title 1"/>
+          <p:cNvSpPr>
+            <a:spLocks noGrp="1"/>
+          </p:cNvSpPr>
+          <p:nvPr>
+            <p:ph type="title"/>
+          </p:nvPr>
+        </p:nvSpPr>
+        <p:spPr/>
+        <p:txBody>
+          <a:bodyPr/>
+          <a:lstStyle/>
+          <a:p>
+            <a:r>
+              <a:rPr lang="en-US" dirty="0" smtClean="0"/>
+              <a:t>Algorithms and Calculations</a:t>
+            </a:r>
+            <a:endParaRPr lang="en-US" dirty="0"/>
+          </a:p>
+        </p:txBody>
+      </p:sp>
+      <p:sp>
+        <p:nvSpPr>
+          <p:cNvPr id="3" name="Content Placeholder 2"/>
+          <p:cNvSpPr>
+            <a:spLocks noGrp="1"/>
+          </p:cNvSpPr>
+          <p:nvPr>
+            <p:ph idx="1"/>
+          </p:nvPr>
+        </p:nvSpPr>
+        <p:spPr/>
+        <p:txBody>
+          <a:bodyPr>
+            <a:normAutofit/>
+          </a:bodyPr>
+          <a:lstStyle/>
+          <a:p>
+            <a:r>
+              <a:rPr lang="en-US" dirty="0" smtClean="0"/>
+              <a:t>Player Ability Modifiers</a:t>
+            </a:r>
+          </a:p>
+          <a:p>
+            <a:pPr lvl="1"/>
+            <a:r>
+              <a:rPr lang="en-US" dirty="0" smtClean="0"/>
+              <a:t>Must be </a:t>
+            </a:r>
+            <a:r>
+              <a:rPr lang="en-US" dirty="0"/>
+              <a:t>able to dynamically change ability modifiers as gear is </a:t>
+            </a:r>
+            <a:r>
+              <a:rPr lang="en-US" dirty="0" smtClean="0"/>
+              <a:t>added or removed</a:t>
+            </a:r>
+          </a:p>
+          <a:p>
+            <a:pPr lvl="1"/>
+            <a:r>
+              <a:rPr lang="en-US" dirty="0" smtClean="0"/>
+              <a:t>Items can affect a players abilities and can compound </a:t>
+            </a:r>
+            <a:r>
+              <a:rPr lang="en-US" dirty="0" smtClean="0"/>
+              <a:t>with</a:t>
+            </a:r>
+            <a:r>
+              <a:rPr lang="en-US" dirty="0" smtClean="0"/>
+              <a:t> </a:t>
+            </a:r>
+            <a:r>
+              <a:rPr lang="en-US" dirty="0" smtClean="0"/>
+              <a:t>each other</a:t>
+            </a:r>
+          </a:p>
+          <a:p>
+            <a:r>
+              <a:rPr lang="en-US" dirty="0" smtClean="0"/>
+              <a:t>Combat Rolls</a:t>
+            </a:r>
+          </a:p>
+          <a:p>
+            <a:pPr lvl="1"/>
+            <a:r>
+              <a:rPr lang="en-US" dirty="0" smtClean="0"/>
+              <a:t>Calculate combat rolls based on all modifiers</a:t>
+            </a:r>
+          </a:p>
+          <a:p>
+            <a:pPr lvl="1"/>
+            <a:r>
+              <a:rPr lang="en-US" dirty="0" smtClean="0"/>
+              <a:t>Must account for what modifiers are relevant to the situation, based on the character</a:t>
+            </a:r>
+            <a:endParaRPr lang="en-US" dirty="0"/>
+          </a:p>
+          <a:p>
+            <a:r>
+              <a:rPr lang="en-US" dirty="0" smtClean="0"/>
+              <a:t>Dynamically managing memory</a:t>
+            </a:r>
+          </a:p>
+          <a:p>
+            <a:pPr lvl="1"/>
+            <a:r>
+              <a:rPr lang="en-US" dirty="0" smtClean="0"/>
+              <a:t>Character may have too much information to keep everything loaded</a:t>
+            </a:r>
+          </a:p>
+          <a:p>
+            <a:pPr lvl="1"/>
+            <a:r>
+              <a:rPr lang="en-US" dirty="0" smtClean="0"/>
+              <a:t>Calculating relative weights of items to determine what to keep visible</a:t>
+            </a:r>
+            <a:endParaRPr lang="en-US" dirty="0"/>
+          </a:p>
+          <a:p>
+            <a:endParaRPr lang="en-US" dirty="0"/>
+          </a:p>
+        </p:txBody>
+      </p:sp>
+      <p:sp>
+        <p:nvSpPr>
+          <p:cNvPr id="4" name="TextBox 3"/>
+          <p:cNvSpPr txBox="1"/>
+          <p:nvPr/>
+        </p:nvSpPr>
+        <p:spPr>
+          <a:xfrm>
+            <a:off x="471286" y="6488668"/>
+            <a:ext cx="1163305" cy="369332"/>
+          </a:xfrm>
+          <a:prstGeom prst="rect">
+            <a:avLst/>
+          </a:prstGeom>
+          <a:noFill/>
+        </p:spPr>
+        <p:txBody>
+          <a:bodyPr wrap="square" rtlCol="0">
+            <a:spAutoFit/>
+          </a:bodyPr>
+          <a:lstStyle/>
+          <a:p>
+            <a:r>
+              <a:rPr lang="en-US" dirty="0" smtClean="0"/>
+              <a:t>Slide </a:t>
+            </a:r>
+            <a:r>
+              <a:rPr lang="en-US" dirty="0"/>
+              <a:t>9</a:t>
+            </a:r>
+          </a:p>
+        </p:txBody>
+      </p:sp>
+    </p:spTree>
+    <p:extLst>
+      <p:ext uri="{BB962C8B-B14F-4D97-AF65-F5344CB8AC3E}">
+        <p14:creationId xmlns:p14="http://schemas.microsoft.com/office/powerpoint/2010/main" val="639210710"/>
       </p:ext>
     </p:extLst>
   </p:cSld>

</xml_diff>